<commit_message>
new 1 branch modified
</commit_message>
<xml_diff>
--- a/2nd Phase Review Presentation.pptx
+++ b/2nd Phase Review Presentation.pptx
@@ -279,7 +279,7 @@
       </p15:sldGuideLst>
     </p:ext>
     <p:ext uri="GoogleSlidesCustomDataVersion2">
-      <go:slidesCustomData xmlns:go="http://customooxmlschemas.google.com/" xmlns:ahyp="http://schemas.microsoft.com/office/drawing/2018/hyperlinkcolor" xmlns:p15="http://schemas.microsoft.com/office/powerpoint/2012/main" xmlns:p14="http://schemas.microsoft.com/office/powerpoint/2010/main" xmlns:com="http://schemas.openxmlformats.org/drawingml/2006/compatibility" xmlns:pvml="urn:schemas-microsoft-com:office:powerpoint" xmlns:v="urn:schemas-microsoft-com:vml" xmlns:o="urn:schemas-microsoft-com:office:office" xmlns:dgm="http://schemas.openxmlformats.org/drawingml/2006/diagram" xmlns:c="http://schemas.openxmlformats.org/drawingml/2006/chart" xmlns:mv="urn:schemas-microsoft-com:mac:vml" xmlns:mc="http://schemas.openxmlformats.org/markup-compatibility/2006" xmlns="" r:id="rId32" roundtripDataSignature="AMtx7mgZZABVuYV0kWWDJ77bXyEyKU5AvA=="/>
+      <go:slidesCustomData xmlns="" xmlns:mc="http://schemas.openxmlformats.org/markup-compatibility/2006" xmlns:mv="urn:schemas-microsoft-com:mac:vml" xmlns:c="http://schemas.openxmlformats.org/drawingml/2006/chart" xmlns:dgm="http://schemas.openxmlformats.org/drawingml/2006/diagram" xmlns:o="urn:schemas-microsoft-com:office:office" xmlns:v="urn:schemas-microsoft-com:vml" xmlns:pvml="urn:schemas-microsoft-com:office:powerpoint" xmlns:com="http://schemas.openxmlformats.org/drawingml/2006/compatibility" xmlns:p14="http://schemas.microsoft.com/office/powerpoint/2010/main" xmlns:p15="http://schemas.microsoft.com/office/powerpoint/2012/main" xmlns:ahyp="http://schemas.microsoft.com/office/drawing/2018/hyperlinkcolor" xmlns:go="http://customooxmlschemas.google.com/" r:id="rId32" roundtripDataSignature="AMtx7mgZZABVuYV0kWWDJ77bXyEyKU5AvA=="/>
     </p:ext>
   </p:extLst>
 </p:presentation>
@@ -18098,20 +18098,16 @@
                 <a:cs typeface="Century Gothic"/>
                 <a:sym typeface="Century Gothic"/>
               </a:rPr>
-              <a:t>Jiuxiang Gu, Jianfei Cai, Gang Wang and Tsuhan Chen [2018]. Stack-Captioning: Coarse-to-Fine Learning for Image Captioning </a:t>
+              <a:t>Jiuxiang Gu, Jianfei Cai, Gang Wang and Tsuhan Chen [2018]. Stack-Captioning: Coarse-to-Fine Learning for </a:t>
             </a:r>
             <a:r>
-              <a:rPr lang="en" sz="1400" u="sng" dirty="0">
-                <a:solidFill>
-                  <a:schemeClr val="hlink"/>
-                </a:solidFill>
+              <a:rPr lang="en" sz="1400">
                 <a:latin typeface="Century Gothic"/>
                 <a:ea typeface="Century Gothic"/>
                 <a:cs typeface="Century Gothic"/>
                 <a:sym typeface="Century Gothic"/>
-                <a:hlinkClick r:id="rId7"/>
               </a:rPr>
-              <a:t>https://ojs.aaai.org/index.php/AAAI/article/view/12266</a:t>
+              <a:t>Image Captioning</a:t>
             </a:r>
             <a:endParaRPr sz="1400" dirty="0">
               <a:latin typeface="Century Gothic"/>

</xml_diff>